<commit_message>
First take al energy-distribution algorithm
</commit_message>
<xml_diff>
--- a/Indeling.pptx
+++ b/Indeling.pptx
@@ -6,6 +6,7 @@
   </p:sldMasterIdLst>
   <p:sldIdLst>
     <p:sldId id="256" r:id="rId2"/>
+    <p:sldId id="257" r:id="rId3"/>
   </p:sldIdLst>
   <p:sldSz cx="12192000" cy="6858000"/>
   <p:notesSz cx="6858000" cy="9144000"/>
@@ -104,6 +105,11 @@
       </a:defRPr>
     </a:lvl9pPr>
   </p:defaultTextStyle>
+  <p:extLst>
+    <p:ext uri="{EFAFB233-063F-42B5-8137-9DF3F51BA10A}">
+      <p15:sldGuideLst xmlns:p15="http://schemas.microsoft.com/office/powerpoint/2012/main"/>
+    </p:ext>
+  </p:extLst>
 </p:presentation>
 </file>
 
@@ -238,7 +244,7 @@
           <a:p>
             <a:fld id="{70AD4863-2A8C-4590-B00D-7CE781269695}" type="datetimeFigureOut">
               <a:rPr lang="nl-NL" smtClean="0"/>
-              <a:t>30-3-2016</a:t>
+              <a:t>15-5-2016</a:t>
             </a:fld>
             <a:endParaRPr lang="nl-NL"/>
           </a:p>
@@ -408,7 +414,7 @@
           <a:p>
             <a:fld id="{70AD4863-2A8C-4590-B00D-7CE781269695}" type="datetimeFigureOut">
               <a:rPr lang="nl-NL" smtClean="0"/>
-              <a:t>30-3-2016</a:t>
+              <a:t>15-5-2016</a:t>
             </a:fld>
             <a:endParaRPr lang="nl-NL"/>
           </a:p>
@@ -588,7 +594,7 @@
           <a:p>
             <a:fld id="{70AD4863-2A8C-4590-B00D-7CE781269695}" type="datetimeFigureOut">
               <a:rPr lang="nl-NL" smtClean="0"/>
-              <a:t>30-3-2016</a:t>
+              <a:t>15-5-2016</a:t>
             </a:fld>
             <a:endParaRPr lang="nl-NL"/>
           </a:p>
@@ -758,7 +764,7 @@
           <a:p>
             <a:fld id="{70AD4863-2A8C-4590-B00D-7CE781269695}" type="datetimeFigureOut">
               <a:rPr lang="nl-NL" smtClean="0"/>
-              <a:t>30-3-2016</a:t>
+              <a:t>15-5-2016</a:t>
             </a:fld>
             <a:endParaRPr lang="nl-NL"/>
           </a:p>
@@ -1004,7 +1010,7 @@
           <a:p>
             <a:fld id="{70AD4863-2A8C-4590-B00D-7CE781269695}" type="datetimeFigureOut">
               <a:rPr lang="nl-NL" smtClean="0"/>
-              <a:t>30-3-2016</a:t>
+              <a:t>15-5-2016</a:t>
             </a:fld>
             <a:endParaRPr lang="nl-NL"/>
           </a:p>
@@ -1236,7 +1242,7 @@
           <a:p>
             <a:fld id="{70AD4863-2A8C-4590-B00D-7CE781269695}" type="datetimeFigureOut">
               <a:rPr lang="nl-NL" smtClean="0"/>
-              <a:t>30-3-2016</a:t>
+              <a:t>15-5-2016</a:t>
             </a:fld>
             <a:endParaRPr lang="nl-NL"/>
           </a:p>
@@ -1603,7 +1609,7 @@
           <a:p>
             <a:fld id="{70AD4863-2A8C-4590-B00D-7CE781269695}" type="datetimeFigureOut">
               <a:rPr lang="nl-NL" smtClean="0"/>
-              <a:t>30-3-2016</a:t>
+              <a:t>15-5-2016</a:t>
             </a:fld>
             <a:endParaRPr lang="nl-NL"/>
           </a:p>
@@ -1721,7 +1727,7 @@
           <a:p>
             <a:fld id="{70AD4863-2A8C-4590-B00D-7CE781269695}" type="datetimeFigureOut">
               <a:rPr lang="nl-NL" smtClean="0"/>
-              <a:t>30-3-2016</a:t>
+              <a:t>15-5-2016</a:t>
             </a:fld>
             <a:endParaRPr lang="nl-NL"/>
           </a:p>
@@ -1816,7 +1822,7 @@
           <a:p>
             <a:fld id="{70AD4863-2A8C-4590-B00D-7CE781269695}" type="datetimeFigureOut">
               <a:rPr lang="nl-NL" smtClean="0"/>
-              <a:t>30-3-2016</a:t>
+              <a:t>15-5-2016</a:t>
             </a:fld>
             <a:endParaRPr lang="nl-NL"/>
           </a:p>
@@ -2093,7 +2099,7 @@
           <a:p>
             <a:fld id="{70AD4863-2A8C-4590-B00D-7CE781269695}" type="datetimeFigureOut">
               <a:rPr lang="nl-NL" smtClean="0"/>
-              <a:t>30-3-2016</a:t>
+              <a:t>15-5-2016</a:t>
             </a:fld>
             <a:endParaRPr lang="nl-NL"/>
           </a:p>
@@ -2346,7 +2352,7 @@
           <a:p>
             <a:fld id="{70AD4863-2A8C-4590-B00D-7CE781269695}" type="datetimeFigureOut">
               <a:rPr lang="nl-NL" smtClean="0"/>
-              <a:t>30-3-2016</a:t>
+              <a:t>15-5-2016</a:t>
             </a:fld>
             <a:endParaRPr lang="nl-NL"/>
           </a:p>
@@ -2559,7 +2565,7 @@
           <a:p>
             <a:fld id="{70AD4863-2A8C-4590-B00D-7CE781269695}" type="datetimeFigureOut">
               <a:rPr lang="nl-NL" smtClean="0"/>
-              <a:t>30-3-2016</a:t>
+              <a:t>15-5-2016</a:t>
             </a:fld>
             <a:endParaRPr lang="nl-NL"/>
           </a:p>
@@ -3702,10 +3708,971 @@
           </a:p>
         </p:txBody>
       </p:sp>
+      <p:sp>
+        <p:nvSpPr>
+          <p:cNvPr id="2" name="Tekstvak 1"/>
+          <p:cNvSpPr txBox="1"/>
+          <p:nvPr/>
+        </p:nvSpPr>
+        <p:spPr>
+          <a:xfrm>
+            <a:off x="576649" y="527222"/>
+            <a:ext cx="433132" cy="369332"/>
+          </a:xfrm>
+          <a:prstGeom prst="rect">
+            <a:avLst/>
+          </a:prstGeom>
+          <a:noFill/>
+        </p:spPr>
+        <p:txBody>
+          <a:bodyPr wrap="none" rtlCol="0">
+            <a:spAutoFit/>
+          </a:bodyPr>
+          <a:lstStyle/>
+          <a:p>
+            <a:r>
+              <a:rPr lang="nl-NL" dirty="0" smtClean="0"/>
+              <a:t>V1</a:t>
+            </a:r>
+            <a:endParaRPr lang="nl-NL" dirty="0"/>
+          </a:p>
+        </p:txBody>
+      </p:sp>
     </p:spTree>
     <p:extLst>
       <p:ext uri="{BB962C8B-B14F-4D97-AF65-F5344CB8AC3E}">
         <p14:creationId xmlns:p14="http://schemas.microsoft.com/office/powerpoint/2010/main" val="2680085717"/>
+      </p:ext>
+    </p:extLst>
+  </p:cSld>
+  <p:clrMapOvr>
+    <a:masterClrMapping/>
+  </p:clrMapOvr>
+</p:sld>
+</file>
+
+<file path=ppt/slides/slide2.xml><?xml version="1.0" encoding="utf-8"?>
+<p:sld xmlns:a="http://schemas.openxmlformats.org/drawingml/2006/main" xmlns:r="http://schemas.openxmlformats.org/officeDocument/2006/relationships" xmlns:p="http://schemas.openxmlformats.org/presentationml/2006/main">
+  <p:cSld>
+    <p:spTree>
+      <p:nvGrpSpPr>
+        <p:cNvPr id="1" name=""/>
+        <p:cNvGrpSpPr/>
+        <p:nvPr/>
+      </p:nvGrpSpPr>
+      <p:grpSpPr>
+        <a:xfrm>
+          <a:off x="0" y="0"/>
+          <a:ext cx="0" cy="0"/>
+          <a:chOff x="0" y="0"/>
+          <a:chExt cx="0" cy="0"/>
+        </a:xfrm>
+      </p:grpSpPr>
+      <p:sp>
+        <p:nvSpPr>
+          <p:cNvPr id="24" name="Rechthoek 23"/>
+          <p:cNvSpPr/>
+          <p:nvPr/>
+        </p:nvSpPr>
+        <p:spPr>
+          <a:xfrm>
+            <a:off x="782595" y="3179805"/>
+            <a:ext cx="6013621" cy="1556952"/>
+          </a:xfrm>
+          <a:prstGeom prst="rect">
+            <a:avLst/>
+          </a:prstGeom>
+          <a:solidFill>
+            <a:schemeClr val="accent4"/>
+          </a:solidFill>
+        </p:spPr>
+        <p:style>
+          <a:lnRef idx="2">
+            <a:schemeClr val="accent1">
+              <a:shade val="50000"/>
+            </a:schemeClr>
+          </a:lnRef>
+          <a:fillRef idx="1">
+            <a:schemeClr val="accent1"/>
+          </a:fillRef>
+          <a:effectRef idx="0">
+            <a:schemeClr val="accent1"/>
+          </a:effectRef>
+          <a:fontRef idx="minor">
+            <a:schemeClr val="lt1"/>
+          </a:fontRef>
+        </p:style>
+        <p:txBody>
+          <a:bodyPr rtlCol="0" anchor="ctr"/>
+          <a:lstStyle/>
+          <a:p>
+            <a:pPr algn="ctr"/>
+            <a:endParaRPr lang="nl-NL" dirty="0"/>
+          </a:p>
+        </p:txBody>
+      </p:sp>
+      <p:sp>
+        <p:nvSpPr>
+          <p:cNvPr id="4" name="Rechthoek 3"/>
+          <p:cNvSpPr/>
+          <p:nvPr/>
+        </p:nvSpPr>
+        <p:spPr>
+          <a:xfrm>
+            <a:off x="955589" y="1986693"/>
+            <a:ext cx="1293340" cy="914400"/>
+          </a:xfrm>
+          <a:prstGeom prst="rect">
+            <a:avLst/>
+          </a:prstGeom>
+        </p:spPr>
+        <p:style>
+          <a:lnRef idx="2">
+            <a:schemeClr val="accent1">
+              <a:shade val="50000"/>
+            </a:schemeClr>
+          </a:lnRef>
+          <a:fillRef idx="1">
+            <a:schemeClr val="accent1"/>
+          </a:fillRef>
+          <a:effectRef idx="0">
+            <a:schemeClr val="accent1"/>
+          </a:effectRef>
+          <a:fontRef idx="minor">
+            <a:schemeClr val="lt1"/>
+          </a:fontRef>
+        </p:style>
+        <p:txBody>
+          <a:bodyPr rtlCol="0" anchor="ctr"/>
+          <a:lstStyle/>
+          <a:p>
+            <a:pPr algn="ctr"/>
+            <a:r>
+              <a:rPr lang="nl-NL" dirty="0" smtClean="0"/>
+              <a:t>2D input</a:t>
+            </a:r>
+            <a:endParaRPr lang="nl-NL" dirty="0"/>
+          </a:p>
+        </p:txBody>
+      </p:sp>
+      <p:sp>
+        <p:nvSpPr>
+          <p:cNvPr id="7" name="Rechthoek 6"/>
+          <p:cNvSpPr/>
+          <p:nvPr/>
+        </p:nvSpPr>
+        <p:spPr>
+          <a:xfrm>
+            <a:off x="4988778" y="1986692"/>
+            <a:ext cx="1540476" cy="914400"/>
+          </a:xfrm>
+          <a:prstGeom prst="rect">
+            <a:avLst/>
+          </a:prstGeom>
+        </p:spPr>
+        <p:style>
+          <a:lnRef idx="2">
+            <a:schemeClr val="accent1">
+              <a:shade val="50000"/>
+            </a:schemeClr>
+          </a:lnRef>
+          <a:fillRef idx="1">
+            <a:schemeClr val="accent1"/>
+          </a:fillRef>
+          <a:effectRef idx="0">
+            <a:schemeClr val="accent1"/>
+          </a:effectRef>
+          <a:fontRef idx="minor">
+            <a:schemeClr val="lt1"/>
+          </a:fontRef>
+        </p:style>
+        <p:txBody>
+          <a:bodyPr rtlCol="0" anchor="ctr"/>
+          <a:lstStyle/>
+          <a:p>
+            <a:pPr algn="ctr"/>
+            <a:r>
+              <a:rPr lang="nl-NL" dirty="0" err="1" smtClean="0"/>
+              <a:t>EventHandlers</a:t>
+            </a:r>
+            <a:endParaRPr lang="nl-NL" dirty="0"/>
+          </a:p>
+        </p:txBody>
+      </p:sp>
+      <p:sp>
+        <p:nvSpPr>
+          <p:cNvPr id="13" name="Rechthoek 12"/>
+          <p:cNvSpPr/>
+          <p:nvPr/>
+        </p:nvSpPr>
+        <p:spPr>
+          <a:xfrm>
+            <a:off x="8023478" y="1986693"/>
+            <a:ext cx="1787611" cy="914400"/>
+          </a:xfrm>
+          <a:prstGeom prst="rect">
+            <a:avLst/>
+          </a:prstGeom>
+        </p:spPr>
+        <p:style>
+          <a:lnRef idx="2">
+            <a:schemeClr val="accent1">
+              <a:shade val="50000"/>
+            </a:schemeClr>
+          </a:lnRef>
+          <a:fillRef idx="1">
+            <a:schemeClr val="accent1"/>
+          </a:fillRef>
+          <a:effectRef idx="0">
+            <a:schemeClr val="accent1"/>
+          </a:effectRef>
+          <a:fontRef idx="minor">
+            <a:schemeClr val="lt1"/>
+          </a:fontRef>
+        </p:style>
+        <p:txBody>
+          <a:bodyPr rtlCol="0" anchor="ctr"/>
+          <a:lstStyle/>
+          <a:p>
+            <a:pPr algn="ctr"/>
+            <a:r>
+              <a:rPr lang="nl-NL" dirty="0" smtClean="0"/>
+              <a:t>Game Logic</a:t>
+            </a:r>
+            <a:endParaRPr lang="nl-NL" dirty="0"/>
+          </a:p>
+        </p:txBody>
+      </p:sp>
+      <p:cxnSp>
+        <p:nvCxnSpPr>
+          <p:cNvPr id="20" name="Gebogen verbindingslijn 19"/>
+          <p:cNvCxnSpPr>
+            <a:stCxn id="4" idx="3"/>
+            <a:endCxn id="7" idx="1"/>
+          </p:cNvCxnSpPr>
+          <p:nvPr/>
+        </p:nvCxnSpPr>
+        <p:spPr>
+          <a:xfrm flipV="1">
+            <a:off x="2248929" y="2443892"/>
+            <a:ext cx="2739849" cy="1"/>
+          </a:xfrm>
+          <a:prstGeom prst="bentConnector3">
+            <a:avLst/>
+          </a:prstGeom>
+          <a:ln>
+            <a:tailEnd type="triangle"/>
+          </a:ln>
+        </p:spPr>
+        <p:style>
+          <a:lnRef idx="1">
+            <a:schemeClr val="accent1"/>
+          </a:lnRef>
+          <a:fillRef idx="0">
+            <a:schemeClr val="accent1"/>
+          </a:fillRef>
+          <a:effectRef idx="0">
+            <a:schemeClr val="accent1"/>
+          </a:effectRef>
+          <a:fontRef idx="minor">
+            <a:schemeClr val="tx1"/>
+          </a:fontRef>
+        </p:style>
+      </p:cxnSp>
+      <p:cxnSp>
+        <p:nvCxnSpPr>
+          <p:cNvPr id="22" name="Gebogen verbindingslijn 21"/>
+          <p:cNvCxnSpPr>
+            <a:stCxn id="7" idx="3"/>
+            <a:endCxn id="13" idx="1"/>
+          </p:cNvCxnSpPr>
+          <p:nvPr/>
+        </p:nvCxnSpPr>
+        <p:spPr>
+          <a:xfrm>
+            <a:off x="6529254" y="2443892"/>
+            <a:ext cx="1494224" cy="1"/>
+          </a:xfrm>
+          <a:prstGeom prst="bentConnector3">
+            <a:avLst/>
+          </a:prstGeom>
+          <a:ln>
+            <a:tailEnd type="triangle"/>
+          </a:ln>
+        </p:spPr>
+        <p:style>
+          <a:lnRef idx="1">
+            <a:schemeClr val="accent1"/>
+          </a:lnRef>
+          <a:fillRef idx="0">
+            <a:schemeClr val="accent1"/>
+          </a:fillRef>
+          <a:effectRef idx="0">
+            <a:schemeClr val="accent1"/>
+          </a:effectRef>
+          <a:fontRef idx="minor">
+            <a:schemeClr val="tx1"/>
+          </a:fontRef>
+        </p:style>
+      </p:cxnSp>
+      <p:sp>
+        <p:nvSpPr>
+          <p:cNvPr id="23" name="Rechthoek 22"/>
+          <p:cNvSpPr/>
+          <p:nvPr/>
+        </p:nvSpPr>
+        <p:spPr>
+          <a:xfrm>
+            <a:off x="8276965" y="3560807"/>
+            <a:ext cx="1293340" cy="914400"/>
+          </a:xfrm>
+          <a:prstGeom prst="rect">
+            <a:avLst/>
+          </a:prstGeom>
+        </p:spPr>
+        <p:style>
+          <a:lnRef idx="2">
+            <a:schemeClr val="accent1">
+              <a:shade val="50000"/>
+            </a:schemeClr>
+          </a:lnRef>
+          <a:fillRef idx="1">
+            <a:schemeClr val="accent1"/>
+          </a:fillRef>
+          <a:effectRef idx="0">
+            <a:schemeClr val="accent1"/>
+          </a:effectRef>
+          <a:fontRef idx="minor">
+            <a:schemeClr val="lt1"/>
+          </a:fontRef>
+        </p:style>
+        <p:txBody>
+          <a:bodyPr rtlCol="0" anchor="ctr"/>
+          <a:lstStyle/>
+          <a:p>
+            <a:pPr algn="ctr"/>
+            <a:r>
+              <a:rPr lang="nl-NL" dirty="0" smtClean="0"/>
+              <a:t>Game state</a:t>
+            </a:r>
+            <a:endParaRPr lang="nl-NL" dirty="0"/>
+          </a:p>
+        </p:txBody>
+      </p:sp>
+      <p:cxnSp>
+        <p:nvCxnSpPr>
+          <p:cNvPr id="27" name="Gebogen verbindingslijn 26"/>
+          <p:cNvCxnSpPr>
+            <a:stCxn id="13" idx="0"/>
+            <a:endCxn id="7" idx="0"/>
+          </p:cNvCxnSpPr>
+          <p:nvPr/>
+        </p:nvCxnSpPr>
+        <p:spPr>
+          <a:xfrm rot="16200000" flipV="1">
+            <a:off x="7338150" y="407559"/>
+            <a:ext cx="1" cy="3158268"/>
+          </a:xfrm>
+          <a:prstGeom prst="bentConnector3">
+            <a:avLst>
+              <a:gd name="adj1" fmla="val 22860100000"/>
+            </a:avLst>
+          </a:prstGeom>
+          <a:ln>
+            <a:tailEnd type="triangle"/>
+          </a:ln>
+        </p:spPr>
+        <p:style>
+          <a:lnRef idx="1">
+            <a:schemeClr val="accent1"/>
+          </a:lnRef>
+          <a:fillRef idx="0">
+            <a:schemeClr val="accent1"/>
+          </a:fillRef>
+          <a:effectRef idx="0">
+            <a:schemeClr val="accent1"/>
+          </a:effectRef>
+          <a:fontRef idx="minor">
+            <a:schemeClr val="tx1"/>
+          </a:fontRef>
+        </p:style>
+      </p:cxnSp>
+      <p:cxnSp>
+        <p:nvCxnSpPr>
+          <p:cNvPr id="29" name="Gebogen verbindingslijn 28"/>
+          <p:cNvCxnSpPr>
+            <a:stCxn id="13" idx="2"/>
+            <a:endCxn id="23" idx="0"/>
+          </p:cNvCxnSpPr>
+          <p:nvPr/>
+        </p:nvCxnSpPr>
+        <p:spPr>
+          <a:xfrm rot="16200000" flipH="1">
+            <a:off x="8590602" y="3227774"/>
+            <a:ext cx="659714" cy="6351"/>
+          </a:xfrm>
+          <a:prstGeom prst="bentConnector3">
+            <a:avLst>
+              <a:gd name="adj1" fmla="val 50000"/>
+            </a:avLst>
+          </a:prstGeom>
+          <a:ln>
+            <a:tailEnd type="triangle"/>
+          </a:ln>
+        </p:spPr>
+        <p:style>
+          <a:lnRef idx="1">
+            <a:schemeClr val="accent1"/>
+          </a:lnRef>
+          <a:fillRef idx="0">
+            <a:schemeClr val="accent1"/>
+          </a:fillRef>
+          <a:effectRef idx="0">
+            <a:schemeClr val="accent1"/>
+          </a:effectRef>
+          <a:fontRef idx="minor">
+            <a:schemeClr val="tx1"/>
+          </a:fontRef>
+        </p:style>
+      </p:cxnSp>
+      <p:sp>
+        <p:nvSpPr>
+          <p:cNvPr id="31" name="Rechthoek 30"/>
+          <p:cNvSpPr/>
+          <p:nvPr/>
+        </p:nvSpPr>
+        <p:spPr>
+          <a:xfrm>
+            <a:off x="955589" y="3567158"/>
+            <a:ext cx="1293340" cy="914400"/>
+          </a:xfrm>
+          <a:prstGeom prst="rect">
+            <a:avLst/>
+          </a:prstGeom>
+        </p:spPr>
+        <p:style>
+          <a:lnRef idx="2">
+            <a:schemeClr val="accent1">
+              <a:shade val="50000"/>
+            </a:schemeClr>
+          </a:lnRef>
+          <a:fillRef idx="1">
+            <a:schemeClr val="accent1"/>
+          </a:fillRef>
+          <a:effectRef idx="0">
+            <a:schemeClr val="accent1"/>
+          </a:effectRef>
+          <a:fontRef idx="minor">
+            <a:schemeClr val="lt1"/>
+          </a:fontRef>
+        </p:style>
+        <p:txBody>
+          <a:bodyPr rtlCol="0" anchor="ctr"/>
+          <a:lstStyle/>
+          <a:p>
+            <a:pPr algn="ctr"/>
+            <a:r>
+              <a:rPr lang="nl-NL" dirty="0"/>
+              <a:t>3</a:t>
+            </a:r>
+            <a:r>
+              <a:rPr lang="nl-NL" dirty="0" smtClean="0"/>
+              <a:t>D output</a:t>
+            </a:r>
+            <a:endParaRPr lang="nl-NL" dirty="0"/>
+          </a:p>
+        </p:txBody>
+      </p:sp>
+      <p:cxnSp>
+        <p:nvCxnSpPr>
+          <p:cNvPr id="33" name="Gebogen verbindingslijn 32"/>
+          <p:cNvCxnSpPr>
+            <a:stCxn id="23" idx="1"/>
+            <a:endCxn id="31" idx="3"/>
+          </p:cNvCxnSpPr>
+          <p:nvPr/>
+        </p:nvCxnSpPr>
+        <p:spPr>
+          <a:xfrm rot="10800000" flipV="1">
+            <a:off x="2248929" y="4018006"/>
+            <a:ext cx="6028036" cy="6351"/>
+          </a:xfrm>
+          <a:prstGeom prst="bentConnector3">
+            <a:avLst>
+              <a:gd name="adj1" fmla="val 50000"/>
+            </a:avLst>
+          </a:prstGeom>
+          <a:ln>
+            <a:tailEnd type="triangle"/>
+          </a:ln>
+        </p:spPr>
+        <p:style>
+          <a:lnRef idx="1">
+            <a:schemeClr val="accent1"/>
+          </a:lnRef>
+          <a:fillRef idx="0">
+            <a:schemeClr val="accent1"/>
+          </a:fillRef>
+          <a:effectRef idx="0">
+            <a:schemeClr val="accent1"/>
+          </a:effectRef>
+          <a:fontRef idx="minor">
+            <a:schemeClr val="tx1"/>
+          </a:fontRef>
+        </p:style>
+      </p:cxnSp>
+      <p:sp>
+        <p:nvSpPr>
+          <p:cNvPr id="36" name="Rechthoek 35"/>
+          <p:cNvSpPr/>
+          <p:nvPr/>
+        </p:nvSpPr>
+        <p:spPr>
+          <a:xfrm>
+            <a:off x="955588" y="4932406"/>
+            <a:ext cx="1293340" cy="914400"/>
+          </a:xfrm>
+          <a:prstGeom prst="rect">
+            <a:avLst/>
+          </a:prstGeom>
+        </p:spPr>
+        <p:style>
+          <a:lnRef idx="2">
+            <a:schemeClr val="accent1">
+              <a:shade val="50000"/>
+            </a:schemeClr>
+          </a:lnRef>
+          <a:fillRef idx="1">
+            <a:schemeClr val="accent1"/>
+          </a:fillRef>
+          <a:effectRef idx="0">
+            <a:schemeClr val="accent1"/>
+          </a:effectRef>
+          <a:fontRef idx="minor">
+            <a:schemeClr val="lt1"/>
+          </a:fontRef>
+        </p:style>
+        <p:txBody>
+          <a:bodyPr rtlCol="0" anchor="ctr"/>
+          <a:lstStyle/>
+          <a:p>
+            <a:pPr algn="ctr"/>
+            <a:r>
+              <a:rPr lang="nl-NL" dirty="0" smtClean="0"/>
+              <a:t>2D output</a:t>
+            </a:r>
+            <a:endParaRPr lang="nl-NL" dirty="0"/>
+          </a:p>
+        </p:txBody>
+      </p:sp>
+      <p:sp>
+        <p:nvSpPr>
+          <p:cNvPr id="37" name="Rechthoek 36"/>
+          <p:cNvSpPr/>
+          <p:nvPr/>
+        </p:nvSpPr>
+        <p:spPr>
+          <a:xfrm>
+            <a:off x="2570202" y="5840454"/>
+            <a:ext cx="3959052" cy="672415"/>
+          </a:xfrm>
+          <a:prstGeom prst="rect">
+            <a:avLst/>
+          </a:prstGeom>
+        </p:spPr>
+        <p:style>
+          <a:lnRef idx="2">
+            <a:schemeClr val="accent1">
+              <a:shade val="50000"/>
+            </a:schemeClr>
+          </a:lnRef>
+          <a:fillRef idx="1">
+            <a:schemeClr val="accent1"/>
+          </a:fillRef>
+          <a:effectRef idx="0">
+            <a:schemeClr val="accent1"/>
+          </a:effectRef>
+          <a:fontRef idx="minor">
+            <a:schemeClr val="lt1"/>
+          </a:fontRef>
+        </p:style>
+        <p:txBody>
+          <a:bodyPr rtlCol="0" anchor="ctr"/>
+          <a:lstStyle/>
+          <a:p>
+            <a:pPr algn="ctr"/>
+            <a:r>
+              <a:rPr lang="nl-NL" dirty="0" err="1" smtClean="0"/>
+              <a:t>RequestAnimationFrame</a:t>
+            </a:r>
+            <a:endParaRPr lang="nl-NL" dirty="0"/>
+          </a:p>
+        </p:txBody>
+      </p:sp>
+      <p:cxnSp>
+        <p:nvCxnSpPr>
+          <p:cNvPr id="45" name="Gebogen verbindingslijn 44"/>
+          <p:cNvCxnSpPr>
+            <a:stCxn id="23" idx="2"/>
+            <a:endCxn id="36" idx="3"/>
+          </p:cNvCxnSpPr>
+          <p:nvPr/>
+        </p:nvCxnSpPr>
+        <p:spPr>
+          <a:xfrm rot="5400000">
+            <a:off x="5129083" y="1595053"/>
+            <a:ext cx="914399" cy="6674707"/>
+          </a:xfrm>
+          <a:prstGeom prst="bentConnector2">
+            <a:avLst/>
+          </a:prstGeom>
+          <a:ln>
+            <a:tailEnd type="triangle"/>
+          </a:ln>
+        </p:spPr>
+        <p:style>
+          <a:lnRef idx="1">
+            <a:schemeClr val="accent1"/>
+          </a:lnRef>
+          <a:fillRef idx="0">
+            <a:schemeClr val="accent1"/>
+          </a:fillRef>
+          <a:effectRef idx="0">
+            <a:schemeClr val="accent1"/>
+          </a:effectRef>
+          <a:fontRef idx="minor">
+            <a:schemeClr val="tx1"/>
+          </a:fontRef>
+        </p:style>
+      </p:cxnSp>
+      <p:cxnSp>
+        <p:nvCxnSpPr>
+          <p:cNvPr id="49" name="Rechte verbindingslijn met pijl 48"/>
+          <p:cNvCxnSpPr/>
+          <p:nvPr/>
+        </p:nvCxnSpPr>
+        <p:spPr>
+          <a:xfrm flipV="1">
+            <a:off x="2564022" y="5390117"/>
+            <a:ext cx="6179" cy="457200"/>
+          </a:xfrm>
+          <a:prstGeom prst="straightConnector1">
+            <a:avLst/>
+          </a:prstGeom>
+          <a:ln>
+            <a:tailEnd type="triangle"/>
+          </a:ln>
+        </p:spPr>
+        <p:style>
+          <a:lnRef idx="1">
+            <a:schemeClr val="accent1"/>
+          </a:lnRef>
+          <a:fillRef idx="0">
+            <a:schemeClr val="accent1"/>
+          </a:fillRef>
+          <a:effectRef idx="0">
+            <a:schemeClr val="accent1"/>
+          </a:effectRef>
+          <a:fontRef idx="minor">
+            <a:schemeClr val="tx1"/>
+          </a:fontRef>
+        </p:style>
+      </p:cxnSp>
+      <p:cxnSp>
+        <p:nvCxnSpPr>
+          <p:cNvPr id="51" name="Rechte verbindingslijn met pijl 50"/>
+          <p:cNvCxnSpPr/>
+          <p:nvPr/>
+        </p:nvCxnSpPr>
+        <p:spPr>
+          <a:xfrm flipV="1">
+            <a:off x="2564022" y="4031217"/>
+            <a:ext cx="0" cy="1358899"/>
+          </a:xfrm>
+          <a:prstGeom prst="straightConnector1">
+            <a:avLst/>
+          </a:prstGeom>
+          <a:ln>
+            <a:tailEnd type="triangle"/>
+          </a:ln>
+        </p:spPr>
+        <p:style>
+          <a:lnRef idx="1">
+            <a:schemeClr val="accent1"/>
+          </a:lnRef>
+          <a:fillRef idx="0">
+            <a:schemeClr val="accent1"/>
+          </a:fillRef>
+          <a:effectRef idx="0">
+            <a:schemeClr val="accent1"/>
+          </a:effectRef>
+          <a:fontRef idx="minor">
+            <a:schemeClr val="tx1"/>
+          </a:fontRef>
+        </p:style>
+      </p:cxnSp>
+      <p:sp>
+        <p:nvSpPr>
+          <p:cNvPr id="2" name="Tekstvak 1"/>
+          <p:cNvSpPr txBox="1"/>
+          <p:nvPr/>
+        </p:nvSpPr>
+        <p:spPr>
+          <a:xfrm>
+            <a:off x="576649" y="527222"/>
+            <a:ext cx="433132" cy="369332"/>
+          </a:xfrm>
+          <a:prstGeom prst="rect">
+            <a:avLst/>
+          </a:prstGeom>
+          <a:noFill/>
+        </p:spPr>
+        <p:txBody>
+          <a:bodyPr wrap="none" rtlCol="0">
+            <a:spAutoFit/>
+          </a:bodyPr>
+          <a:lstStyle/>
+          <a:p>
+            <a:r>
+              <a:rPr lang="nl-NL" dirty="0" smtClean="0"/>
+              <a:t>V2</a:t>
+            </a:r>
+            <a:endParaRPr lang="nl-NL" dirty="0"/>
+          </a:p>
+        </p:txBody>
+      </p:sp>
+      <p:sp>
+        <p:nvSpPr>
+          <p:cNvPr id="26" name="Rechthoek 25"/>
+          <p:cNvSpPr/>
+          <p:nvPr/>
+        </p:nvSpPr>
+        <p:spPr>
+          <a:xfrm>
+            <a:off x="2751262" y="1986693"/>
+            <a:ext cx="1762129" cy="914400"/>
+          </a:xfrm>
+          <a:prstGeom prst="rect">
+            <a:avLst/>
+          </a:prstGeom>
+        </p:spPr>
+        <p:style>
+          <a:lnRef idx="2">
+            <a:schemeClr val="accent1">
+              <a:shade val="50000"/>
+            </a:schemeClr>
+          </a:lnRef>
+          <a:fillRef idx="1">
+            <a:schemeClr val="accent1"/>
+          </a:fillRef>
+          <a:effectRef idx="0">
+            <a:schemeClr val="accent1"/>
+          </a:effectRef>
+          <a:fontRef idx="minor">
+            <a:schemeClr val="lt1"/>
+          </a:fontRef>
+        </p:style>
+        <p:txBody>
+          <a:bodyPr rtlCol="0" anchor="ctr"/>
+          <a:lstStyle/>
+          <a:p>
+            <a:pPr algn="ctr"/>
+            <a:r>
+              <a:rPr lang="nl-NL" dirty="0" smtClean="0"/>
+              <a:t>2D events</a:t>
+            </a:r>
+            <a:endParaRPr lang="nl-NL" dirty="0"/>
+          </a:p>
+        </p:txBody>
+      </p:sp>
+      <p:sp>
+        <p:nvSpPr>
+          <p:cNvPr id="25" name="Tekstvak 24"/>
+          <p:cNvSpPr txBox="1"/>
+          <p:nvPr/>
+        </p:nvSpPr>
+        <p:spPr>
+          <a:xfrm>
+            <a:off x="897524" y="3186156"/>
+            <a:ext cx="1321580" cy="369332"/>
+          </a:xfrm>
+          <a:prstGeom prst="rect">
+            <a:avLst/>
+          </a:prstGeom>
+          <a:noFill/>
+        </p:spPr>
+        <p:txBody>
+          <a:bodyPr wrap="none" rtlCol="0">
+            <a:spAutoFit/>
+          </a:bodyPr>
+          <a:lstStyle/>
+          <a:p>
+            <a:r>
+              <a:rPr lang="nl-NL" dirty="0" smtClean="0"/>
+              <a:t>3D </a:t>
+            </a:r>
+            <a:r>
+              <a:rPr lang="nl-NL" dirty="0" err="1" smtClean="0"/>
+              <a:t>renderer</a:t>
+            </a:r>
+            <a:endParaRPr lang="nl-NL" dirty="0"/>
+          </a:p>
+        </p:txBody>
+      </p:sp>
+      <p:sp>
+        <p:nvSpPr>
+          <p:cNvPr id="38" name="Rechthoek 37"/>
+          <p:cNvSpPr/>
+          <p:nvPr/>
+        </p:nvSpPr>
+        <p:spPr>
+          <a:xfrm>
+            <a:off x="2772800" y="3530945"/>
+            <a:ext cx="1740592" cy="914400"/>
+          </a:xfrm>
+          <a:prstGeom prst="rect">
+            <a:avLst/>
+          </a:prstGeom>
+        </p:spPr>
+        <p:style>
+          <a:lnRef idx="2">
+            <a:schemeClr val="accent1">
+              <a:shade val="50000"/>
+            </a:schemeClr>
+          </a:lnRef>
+          <a:fillRef idx="1">
+            <a:schemeClr val="accent1"/>
+          </a:fillRef>
+          <a:effectRef idx="0">
+            <a:schemeClr val="accent1"/>
+          </a:effectRef>
+          <a:fontRef idx="minor">
+            <a:schemeClr val="lt1"/>
+          </a:fontRef>
+        </p:style>
+        <p:txBody>
+          <a:bodyPr rtlCol="0" anchor="ctr"/>
+          <a:lstStyle/>
+          <a:p>
+            <a:pPr algn="ctr"/>
+            <a:r>
+              <a:rPr lang="nl-NL" dirty="0"/>
+              <a:t>3</a:t>
+            </a:r>
+            <a:r>
+              <a:rPr lang="nl-NL" dirty="0" smtClean="0"/>
+              <a:t>D </a:t>
+            </a:r>
+            <a:r>
+              <a:rPr lang="nl-NL" dirty="0" err="1" smtClean="0"/>
+              <a:t>meshes</a:t>
+            </a:r>
+            <a:r>
+              <a:rPr lang="nl-NL" dirty="0" smtClean="0"/>
+              <a:t>, </a:t>
+            </a:r>
+            <a:r>
+              <a:rPr lang="nl-NL" dirty="0" err="1" smtClean="0"/>
+              <a:t>render-specific</a:t>
+            </a:r>
+            <a:r>
+              <a:rPr lang="nl-NL" dirty="0" smtClean="0"/>
+              <a:t> state</a:t>
+            </a:r>
+            <a:endParaRPr lang="nl-NL" dirty="0"/>
+          </a:p>
+        </p:txBody>
+      </p:sp>
+      <p:sp>
+        <p:nvSpPr>
+          <p:cNvPr id="54" name="Rechthoek 53"/>
+          <p:cNvSpPr/>
+          <p:nvPr/>
+        </p:nvSpPr>
+        <p:spPr>
+          <a:xfrm>
+            <a:off x="4963121" y="3308010"/>
+            <a:ext cx="1540476" cy="596212"/>
+          </a:xfrm>
+          <a:prstGeom prst="rect">
+            <a:avLst/>
+          </a:prstGeom>
+        </p:spPr>
+        <p:style>
+          <a:lnRef idx="2">
+            <a:schemeClr val="accent1">
+              <a:shade val="50000"/>
+            </a:schemeClr>
+          </a:lnRef>
+          <a:fillRef idx="1">
+            <a:schemeClr val="accent1"/>
+          </a:fillRef>
+          <a:effectRef idx="0">
+            <a:schemeClr val="accent1"/>
+          </a:effectRef>
+          <a:fontRef idx="minor">
+            <a:schemeClr val="lt1"/>
+          </a:fontRef>
+        </p:style>
+        <p:txBody>
+          <a:bodyPr rtlCol="0" anchor="ctr"/>
+          <a:lstStyle/>
+          <a:p>
+            <a:pPr algn="ctr"/>
+            <a:r>
+              <a:rPr lang="nl-NL" dirty="0" err="1" smtClean="0"/>
+              <a:t>selectEntity</a:t>
+            </a:r>
+            <a:r>
+              <a:rPr lang="nl-NL" dirty="0" smtClean="0"/>
+              <a:t> From2D(…)</a:t>
+            </a:r>
+            <a:endParaRPr lang="nl-NL" dirty="0"/>
+          </a:p>
+        </p:txBody>
+      </p:sp>
+      <p:cxnSp>
+        <p:nvCxnSpPr>
+          <p:cNvPr id="55" name="Gebogen verbindingslijn 54"/>
+          <p:cNvCxnSpPr>
+            <a:stCxn id="7" idx="2"/>
+            <a:endCxn id="54" idx="0"/>
+          </p:cNvCxnSpPr>
+          <p:nvPr/>
+        </p:nvCxnSpPr>
+        <p:spPr>
+          <a:xfrm rot="5400000">
+            <a:off x="5542729" y="3091723"/>
+            <a:ext cx="406918" cy="25657"/>
+          </a:xfrm>
+          <a:prstGeom prst="bentConnector3">
+            <a:avLst>
+              <a:gd name="adj1" fmla="val 50000"/>
+            </a:avLst>
+          </a:prstGeom>
+          <a:ln>
+            <a:tailEnd type="triangle"/>
+          </a:ln>
+        </p:spPr>
+        <p:style>
+          <a:lnRef idx="1">
+            <a:schemeClr val="accent1"/>
+          </a:lnRef>
+          <a:fillRef idx="0">
+            <a:schemeClr val="accent1"/>
+          </a:fillRef>
+          <a:effectRef idx="0">
+            <a:schemeClr val="accent1"/>
+          </a:effectRef>
+          <a:fontRef idx="minor">
+            <a:schemeClr val="tx1"/>
+          </a:fontRef>
+        </p:style>
+      </p:cxnSp>
+    </p:spTree>
+    <p:extLst>
+      <p:ext uri="{BB962C8B-B14F-4D97-AF65-F5344CB8AC3E}">
+        <p14:creationId xmlns:p14="http://schemas.microsoft.com/office/powerpoint/2010/main" val="317328025"/>
       </p:ext>
     </p:extLst>
   </p:cSld>

</xml_diff>